<commit_message>
created refactoring review activity for Thursay
</commit_message>
<xml_diff>
--- a/lessonPlans/names_function.pptx
+++ b/lessonPlans/names_function.pptx
@@ -3813,7 +3813,7 @@
           <a:p>
             <a:r>
               <a:rPr lang="en-US" dirty="0" smtClean="0"/>
-              <a:t>do require you to read the code to understand what the name means.</a:t>
+              <a:t>do not require you to read the code to understand what the name means.</a:t>
             </a:r>
           </a:p>
           <a:p>
@@ -3845,6 +3845,13 @@
   <p:clrMapOvr>
     <a:masterClrMapping/>
   </p:clrMapOvr>
+  <p:timing>
+    <p:tnLst>
+      <p:par>
+        <p:cTn xmlns:p14="http://schemas.microsoft.com/office/powerpoint/2010/main" id="1" dur="indefinite" restart="never" nodeType="tmRoot"/>
+      </p:par>
+    </p:tnLst>
+  </p:timing>
 </p:sld>
 </file>
 
@@ -3911,40 +3918,46 @@
           <a:p>
             <a:pPr lvl="1"/>
             <a:r>
-              <a:rPr lang="en-US" dirty="0" smtClean="0"/>
+              <a:rPr lang="en-US" b="1" dirty="0" smtClean="0"/>
               <a:t>variables</a:t>
             </a:r>
           </a:p>
           <a:p>
             <a:pPr lvl="1"/>
             <a:r>
-              <a:rPr lang="en-US" dirty="0" smtClean="0"/>
+              <a:rPr lang="en-US" b="1" dirty="0" smtClean="0"/>
               <a:t>classes</a:t>
             </a:r>
           </a:p>
           <a:p>
             <a:pPr lvl="1"/>
             <a:r>
-              <a:rPr lang="en-US" dirty="0" err="1" smtClean="0"/>
+              <a:rPr lang="en-US" b="1" dirty="0" err="1" smtClean="0"/>
               <a:t>boolean</a:t>
             </a:r>
             <a:r>
-              <a:rPr lang="en-US" dirty="0" smtClean="0"/>
-              <a:t> variables or methods that return </a:t>
-            </a:r>
-            <a:r>
-              <a:rPr lang="en-US" dirty="0" err="1" smtClean="0"/>
+              <a:rPr lang="en-US" b="1" dirty="0" smtClean="0"/>
+              <a:t> variables</a:t>
+            </a:r>
+          </a:p>
+          <a:p>
+            <a:pPr lvl="1"/>
+            <a:r>
+              <a:rPr lang="en-US" b="1" dirty="0" smtClean="0"/>
+              <a:t>methods</a:t>
+            </a:r>
+          </a:p>
+          <a:p>
+            <a:pPr lvl="1"/>
+            <a:r>
+              <a:rPr lang="en-US" b="1" dirty="0"/>
+              <a:t>methods that return </a:t>
+            </a:r>
+            <a:r>
+              <a:rPr lang="en-US" b="1" dirty="0" err="1" smtClean="0"/>
               <a:t>booleans</a:t>
             </a:r>
-            <a:endParaRPr lang="en-US" dirty="0" smtClean="0"/>
-          </a:p>
-          <a:p>
-            <a:pPr lvl="1"/>
-            <a:r>
-              <a:rPr lang="en-US" dirty="0"/>
-              <a:t>methods</a:t>
-            </a:r>
-            <a:endParaRPr lang="en-US" dirty="0" smtClean="0"/>
+            <a:endParaRPr lang="en-US" b="1" dirty="0" smtClean="0"/>
           </a:p>
           <a:p>
             <a:pPr lvl="1"/>
@@ -3962,6 +3975,13 @@
   <p:clrMapOvr>
     <a:masterClrMapping/>
   </p:clrMapOvr>
+  <p:timing>
+    <p:tnLst>
+      <p:par>
+        <p:cTn xmlns:p14="http://schemas.microsoft.com/office/powerpoint/2010/main" id="1" dur="indefinite" restart="never" nodeType="tmRoot"/>
+      </p:par>
+    </p:tnLst>
+  </p:timing>
 </p:sld>
 </file>
 
@@ -4121,6 +4141,13 @@
   <p:clrMapOvr>
     <a:masterClrMapping/>
   </p:clrMapOvr>
+  <p:timing>
+    <p:tnLst>
+      <p:par>
+        <p:cTn xmlns:p14="http://schemas.microsoft.com/office/powerpoint/2010/main" id="1" dur="indefinite" restart="never" nodeType="tmRoot"/>
+      </p:par>
+    </p:tnLst>
+  </p:timing>
 </p:sld>
 </file>
 
@@ -4193,6 +4220,13 @@
   <p:clrMapOvr>
     <a:masterClrMapping/>
   </p:clrMapOvr>
+  <p:timing>
+    <p:tnLst>
+      <p:par>
+        <p:cTn xmlns:p14="http://schemas.microsoft.com/office/powerpoint/2010/main" id="1" dur="indefinite" restart="never" nodeType="tmRoot"/>
+      </p:par>
+    </p:tnLst>
+  </p:timing>
 </p:sld>
 </file>
 

</xml_diff>